<commit_message>
Atualiza o lancçamento da versão do ES
</commit_message>
<xml_diff>
--- a/parte1/Treinamento 2 - JavaScript - Parte 1.pptx
+++ b/parte1/Treinamento 2 - JavaScript - Parte 1.pptx
@@ -220,7 +220,7 @@
           <a:p>
             <a:fld id="{9B6BF049-9374-4F1D-9012-2492B7F95F04}" type="datetimeFigureOut">
               <a:rPr lang="pt-BR" smtClean="0"/>
-              <a:t>15/01/2018</a:t>
+              <a:t>17/01/2018</a:t>
             </a:fld>
             <a:endParaRPr lang="pt-BR"/>
           </a:p>
@@ -2150,7 +2150,7 @@
           <a:p>
             <a:fld id="{744CA574-0275-4727-8E86-D431B89400F6}" type="datetime1">
               <a:rPr lang="pt-BR" smtClean="0"/>
-              <a:t>15/01/2018</a:t>
+              <a:t>17/01/2018</a:t>
             </a:fld>
             <a:endParaRPr lang="pt-BR"/>
           </a:p>
@@ -2323,7 +2323,7 @@
           <a:p>
             <a:fld id="{EA9BB5FB-3271-4F9A-A1B1-C31985B5A00D}" type="datetime1">
               <a:rPr lang="pt-BR" smtClean="0"/>
-              <a:t>15/01/2018</a:t>
+              <a:t>17/01/2018</a:t>
             </a:fld>
             <a:endParaRPr lang="pt-BR"/>
           </a:p>
@@ -2598,7 +2598,7 @@
           <a:p>
             <a:fld id="{1D27497E-89E0-4457-9D50-B71CC669FCFC}" type="datetime1">
               <a:rPr lang="pt-BR" smtClean="0"/>
-              <a:t>15/01/2018</a:t>
+              <a:t>17/01/2018</a:t>
             </a:fld>
             <a:endParaRPr lang="pt-BR"/>
           </a:p>
@@ -2850,7 +2850,7 @@
           <a:p>
             <a:fld id="{2E6E8A51-9577-4D92-96AA-BE8BFE6948C5}" type="datetime1">
               <a:rPr lang="pt-BR" smtClean="0"/>
-              <a:t>15/01/2018</a:t>
+              <a:t>17/01/2018</a:t>
             </a:fld>
             <a:endParaRPr lang="pt-BR"/>
           </a:p>
@@ -3044,7 +3044,7 @@
           <a:p>
             <a:fld id="{A1B92794-AE9E-4DA1-AD30-EFFC9163F2B3}" type="datetime1">
               <a:rPr lang="pt-BR" smtClean="0"/>
-              <a:t>15/01/2018</a:t>
+              <a:t>17/01/2018</a:t>
             </a:fld>
             <a:endParaRPr lang="en-US" dirty="0"/>
           </a:p>
@@ -3342,7 +3342,7 @@
           <a:p>
             <a:fld id="{A1D1A6C1-AE08-401D-9AF1-7DBFAAC75FEA}" type="datetime1">
               <a:rPr lang="pt-BR" smtClean="0"/>
-              <a:t>15/01/2018</a:t>
+              <a:t>17/01/2018</a:t>
             </a:fld>
             <a:endParaRPr lang="pt-BR"/>
           </a:p>
@@ -3683,7 +3683,7 @@
           <a:p>
             <a:fld id="{C88F16AB-E7F3-4DF6-9BFF-79044FC97346}" type="datetime1">
               <a:rPr lang="pt-BR" smtClean="0"/>
-              <a:t>15/01/2018</a:t>
+              <a:t>17/01/2018</a:t>
             </a:fld>
             <a:endParaRPr lang="pt-BR"/>
           </a:p>
@@ -4261,7 +4261,7 @@
           <a:p>
             <a:fld id="{158E9144-6818-4837-93DC-BD8DC9AD81B3}" type="datetime1">
               <a:rPr lang="pt-BR" smtClean="0"/>
-              <a:t>15/01/2018</a:t>
+              <a:t>17/01/2018</a:t>
             </a:fld>
             <a:endParaRPr lang="pt-BR"/>
           </a:p>
@@ -4623,7 +4623,7 @@
           <a:p>
             <a:fld id="{32BA1D34-CC38-4D8C-AFD3-6F0CC5C1997C}" type="datetime1">
               <a:rPr lang="pt-BR" smtClean="0"/>
-              <a:t>15/01/2018</a:t>
+              <a:t>17/01/2018</a:t>
             </a:fld>
             <a:endParaRPr lang="pt-BR"/>
           </a:p>
@@ -4938,7 +4938,7 @@
           <a:p>
             <a:fld id="{6E5CEDC8-2664-42FF-A9D9-DDD6FF5CFEBF}" type="datetime1">
               <a:rPr lang="pt-BR" smtClean="0"/>
-              <a:t>15/01/2018</a:t>
+              <a:t>17/01/2018</a:t>
             </a:fld>
             <a:endParaRPr lang="pt-BR"/>
           </a:p>
@@ -5396,7 +5396,7 @@
           <a:p>
             <a:fld id="{A4E218A1-A94F-44A9-BECC-EE5EDB2D8A12}" type="datetime1">
               <a:rPr lang="pt-BR" smtClean="0"/>
-              <a:t>15/01/2018</a:t>
+              <a:t>17/01/2018</a:t>
             </a:fld>
             <a:endParaRPr lang="pt-BR"/>
           </a:p>
@@ -5559,7 +5559,7 @@
           <a:p>
             <a:fld id="{5A7797BF-B59B-42D7-BC31-2EFC97353070}" type="datetime1">
               <a:rPr lang="pt-BR" smtClean="0"/>
-              <a:t>15/01/2018</a:t>
+              <a:t>17/01/2018</a:t>
             </a:fld>
             <a:endParaRPr lang="pt-BR"/>
           </a:p>
@@ -5770,7 +5770,7 @@
           <a:p>
             <a:fld id="{45899652-41B9-4498-A817-021740982A94}" type="datetime1">
               <a:rPr lang="pt-BR" smtClean="0"/>
-              <a:t>15/01/2018</a:t>
+              <a:t>17/01/2018</a:t>
             </a:fld>
             <a:endParaRPr lang="pt-BR"/>
           </a:p>
@@ -8330,7 +8330,6 @@
               <a:rPr lang="pt-BR" dirty="0" smtClean="0"/>
               <a:t>.</a:t>
             </a:r>
-            <a:endParaRPr lang="pt-BR" dirty="0" smtClean="0"/>
           </a:p>
           <a:p>
             <a:r>
@@ -8365,20 +8364,45 @@
             </a:r>
             <a:r>
               <a:rPr lang="pt-BR" dirty="0"/>
-              <a:t>dia 17 de junho de 2015, foi definida a sexta edição da especificação, a ES6 (também chamada de </a:t>
+              <a:t>dia </a:t>
+            </a:r>
+            <a:r>
+              <a:rPr lang="pt-BR" dirty="0" smtClean="0"/>
+              <a:t>28 </a:t>
+            </a:r>
+            <a:r>
+              <a:rPr lang="pt-BR" dirty="0"/>
+              <a:t>de junho de </a:t>
+            </a:r>
+            <a:r>
+              <a:rPr lang="pt-BR" dirty="0" smtClean="0"/>
+              <a:t>2017, </a:t>
+            </a:r>
+            <a:r>
+              <a:rPr lang="pt-BR" dirty="0"/>
+              <a:t>foi definida a sexta edição da especificação, a </a:t>
+            </a:r>
+            <a:r>
+              <a:rPr lang="pt-BR" dirty="0" smtClean="0"/>
+              <a:t>ES8 </a:t>
+            </a:r>
+            <a:r>
+              <a:rPr lang="pt-BR" dirty="0"/>
+              <a:t>(também chamada de </a:t>
             </a:r>
             <a:r>
               <a:rPr lang="pt-BR" dirty="0" err="1"/>
               <a:t>ECMAScript</a:t>
             </a:r>
             <a:r>
-              <a:rPr lang="pt-BR" dirty="0"/>
-              <a:t> 2015</a:t>
-            </a:r>
-            <a:r>
-              <a:rPr lang="pt-BR" dirty="0" smtClean="0"/>
-              <a:t>).</a:t>
-            </a:r>
+              <a:rPr lang="pt-BR"/>
+              <a:t> </a:t>
+            </a:r>
+            <a:r>
+              <a:rPr lang="pt-BR" smtClean="0"/>
+              <a:t>2017).</a:t>
+            </a:r>
+            <a:endParaRPr lang="pt-BR" dirty="0" smtClean="0"/>
           </a:p>
           <a:p>
             <a:endParaRPr lang="pt-BR" dirty="0" smtClean="0"/>

</xml_diff>